<commit_message>
R use slide added to lecture 0
</commit_message>
<xml_diff>
--- a/Lecture slides/Lecture 0 Intro.pptx
+++ b/Lecture slides/Lecture 0 Intro.pptx
@@ -4,12 +4,16 @@
   <p:sldMasterIdLst>
     <p:sldMasterId id="2147483648" r:id="rId1"/>
   </p:sldMasterIdLst>
+  <p:notesMasterIdLst>
+    <p:notesMasterId r:id="rId8"/>
+  </p:notesMasterIdLst>
   <p:sldIdLst>
     <p:sldId id="262" r:id="rId2"/>
-    <p:sldId id="264" r:id="rId3"/>
-    <p:sldId id="265" r:id="rId4"/>
-    <p:sldId id="266" r:id="rId5"/>
-    <p:sldId id="267" r:id="rId6"/>
+    <p:sldId id="268" r:id="rId3"/>
+    <p:sldId id="264" r:id="rId4"/>
+    <p:sldId id="265" r:id="rId5"/>
+    <p:sldId id="266" r:id="rId6"/>
+    <p:sldId id="267" r:id="rId7"/>
   </p:sldIdLst>
   <p:sldSz cx="9144000" cy="6858000" type="screen4x3"/>
   <p:notesSz cx="6858000" cy="9144000"/>
@@ -111,6 +115,756 @@
 </p:presentation>
 </file>
 
+<file path=ppt/notesMasters/notesMaster1.xml><?xml version="1.0" encoding="utf-8"?>
+<p:notesMaster xmlns:a="http://schemas.openxmlformats.org/drawingml/2006/main" xmlns:r="http://schemas.openxmlformats.org/officeDocument/2006/relationships" xmlns:p="http://schemas.openxmlformats.org/presentationml/2006/main">
+  <p:cSld>
+    <p:bg>
+      <p:bgRef idx="1001">
+        <a:schemeClr val="bg1"/>
+      </p:bgRef>
+    </p:bg>
+    <p:spTree>
+      <p:nvGrpSpPr>
+        <p:cNvPr id="1" name=""/>
+        <p:cNvGrpSpPr/>
+        <p:nvPr/>
+      </p:nvGrpSpPr>
+      <p:grpSpPr>
+        <a:xfrm>
+          <a:off x="0" y="0"/>
+          <a:ext cx="0" cy="0"/>
+          <a:chOff x="0" y="0"/>
+          <a:chExt cx="0" cy="0"/>
+        </a:xfrm>
+      </p:grpSpPr>
+      <p:sp>
+        <p:nvSpPr>
+          <p:cNvPr id="2" name="Header Placeholder 1"/>
+          <p:cNvSpPr>
+            <a:spLocks noGrp="1"/>
+          </p:cNvSpPr>
+          <p:nvPr>
+            <p:ph type="hdr" sz="quarter"/>
+          </p:nvPr>
+        </p:nvSpPr>
+        <p:spPr>
+          <a:xfrm>
+            <a:off x="0" y="0"/>
+            <a:ext cx="2971800" cy="457200"/>
+          </a:xfrm>
+          <a:prstGeom prst="rect">
+            <a:avLst/>
+          </a:prstGeom>
+        </p:spPr>
+        <p:txBody>
+          <a:bodyPr vert="horz" lIns="91440" tIns="45720" rIns="91440" bIns="45720" rtlCol="0"/>
+          <a:lstStyle>
+            <a:lvl1pPr algn="l">
+              <a:defRPr sz="1200"/>
+            </a:lvl1pPr>
+          </a:lstStyle>
+          <a:p>
+            <a:endParaRPr lang="en-US"/>
+          </a:p>
+        </p:txBody>
+      </p:sp>
+      <p:sp>
+        <p:nvSpPr>
+          <p:cNvPr id="3" name="Date Placeholder 2"/>
+          <p:cNvSpPr>
+            <a:spLocks noGrp="1"/>
+          </p:cNvSpPr>
+          <p:nvPr>
+            <p:ph type="dt" idx="1"/>
+          </p:nvPr>
+        </p:nvSpPr>
+        <p:spPr>
+          <a:xfrm>
+            <a:off x="3884613" y="0"/>
+            <a:ext cx="2971800" cy="457200"/>
+          </a:xfrm>
+          <a:prstGeom prst="rect">
+            <a:avLst/>
+          </a:prstGeom>
+        </p:spPr>
+        <p:txBody>
+          <a:bodyPr vert="horz" lIns="91440" tIns="45720" rIns="91440" bIns="45720" rtlCol="0"/>
+          <a:lstStyle>
+            <a:lvl1pPr algn="r">
+              <a:defRPr sz="1200"/>
+            </a:lvl1pPr>
+          </a:lstStyle>
+          <a:p>
+            <a:fld id="{73CFAA3E-6650-4747-BAB6-F058A0C45625}" type="datetimeFigureOut">
+              <a:rPr lang="en-US" smtClean="0"/>
+              <a:t>19-09-04</a:t>
+            </a:fld>
+            <a:endParaRPr lang="en-US"/>
+          </a:p>
+        </p:txBody>
+      </p:sp>
+      <p:sp>
+        <p:nvSpPr>
+          <p:cNvPr id="4" name="Slide Image Placeholder 3"/>
+          <p:cNvSpPr>
+            <a:spLocks noGrp="1" noRot="1" noChangeAspect="1"/>
+          </p:cNvSpPr>
+          <p:nvPr>
+            <p:ph type="sldImg" idx="2"/>
+          </p:nvPr>
+        </p:nvSpPr>
+        <p:spPr>
+          <a:xfrm>
+            <a:off x="1143000" y="685800"/>
+            <a:ext cx="4572000" cy="3429000"/>
+          </a:xfrm>
+          <a:prstGeom prst="rect">
+            <a:avLst/>
+          </a:prstGeom>
+          <a:noFill/>
+          <a:ln w="12700">
+            <a:solidFill>
+              <a:prstClr val="black"/>
+            </a:solidFill>
+          </a:ln>
+        </p:spPr>
+        <p:txBody>
+          <a:bodyPr vert="horz" lIns="91440" tIns="45720" rIns="91440" bIns="45720" rtlCol="0" anchor="ctr"/>
+          <a:lstStyle/>
+          <a:p>
+            <a:endParaRPr lang="en-US"/>
+          </a:p>
+        </p:txBody>
+      </p:sp>
+      <p:sp>
+        <p:nvSpPr>
+          <p:cNvPr id="5" name="Notes Placeholder 4"/>
+          <p:cNvSpPr>
+            <a:spLocks noGrp="1"/>
+          </p:cNvSpPr>
+          <p:nvPr>
+            <p:ph type="body" sz="quarter" idx="3"/>
+          </p:nvPr>
+        </p:nvSpPr>
+        <p:spPr>
+          <a:xfrm>
+            <a:off x="685800" y="4343400"/>
+            <a:ext cx="5486400" cy="4114800"/>
+          </a:xfrm>
+          <a:prstGeom prst="rect">
+            <a:avLst/>
+          </a:prstGeom>
+        </p:spPr>
+        <p:txBody>
+          <a:bodyPr vert="horz" lIns="91440" tIns="45720" rIns="91440" bIns="45720" rtlCol="0"/>
+          <a:lstStyle/>
+          <a:p>
+            <a:pPr lvl="0"/>
+            <a:r>
+              <a:rPr lang="en-CA" smtClean="0"/>
+              <a:t>Click to edit Master text styles</a:t>
+            </a:r>
+          </a:p>
+          <a:p>
+            <a:pPr lvl="1"/>
+            <a:r>
+              <a:rPr lang="en-CA" smtClean="0"/>
+              <a:t>Second level</a:t>
+            </a:r>
+          </a:p>
+          <a:p>
+            <a:pPr lvl="2"/>
+            <a:r>
+              <a:rPr lang="en-CA" smtClean="0"/>
+              <a:t>Third level</a:t>
+            </a:r>
+          </a:p>
+          <a:p>
+            <a:pPr lvl="3"/>
+            <a:r>
+              <a:rPr lang="en-CA" smtClean="0"/>
+              <a:t>Fourth level</a:t>
+            </a:r>
+          </a:p>
+          <a:p>
+            <a:pPr lvl="4"/>
+            <a:r>
+              <a:rPr lang="en-CA" smtClean="0"/>
+              <a:t>Fifth level</a:t>
+            </a:r>
+            <a:endParaRPr lang="en-US"/>
+          </a:p>
+        </p:txBody>
+      </p:sp>
+      <p:sp>
+        <p:nvSpPr>
+          <p:cNvPr id="6" name="Footer Placeholder 5"/>
+          <p:cNvSpPr>
+            <a:spLocks noGrp="1"/>
+          </p:cNvSpPr>
+          <p:nvPr>
+            <p:ph type="ftr" sz="quarter" idx="4"/>
+          </p:nvPr>
+        </p:nvSpPr>
+        <p:spPr>
+          <a:xfrm>
+            <a:off x="0" y="8685213"/>
+            <a:ext cx="2971800" cy="457200"/>
+          </a:xfrm>
+          <a:prstGeom prst="rect">
+            <a:avLst/>
+          </a:prstGeom>
+        </p:spPr>
+        <p:txBody>
+          <a:bodyPr vert="horz" lIns="91440" tIns="45720" rIns="91440" bIns="45720" rtlCol="0" anchor="b"/>
+          <a:lstStyle>
+            <a:lvl1pPr algn="l">
+              <a:defRPr sz="1200"/>
+            </a:lvl1pPr>
+          </a:lstStyle>
+          <a:p>
+            <a:endParaRPr lang="en-US"/>
+          </a:p>
+        </p:txBody>
+      </p:sp>
+      <p:sp>
+        <p:nvSpPr>
+          <p:cNvPr id="7" name="Slide Number Placeholder 6"/>
+          <p:cNvSpPr>
+            <a:spLocks noGrp="1"/>
+          </p:cNvSpPr>
+          <p:nvPr>
+            <p:ph type="sldNum" sz="quarter" idx="5"/>
+          </p:nvPr>
+        </p:nvSpPr>
+        <p:spPr>
+          <a:xfrm>
+            <a:off x="3884613" y="8685213"/>
+            <a:ext cx="2971800" cy="457200"/>
+          </a:xfrm>
+          <a:prstGeom prst="rect">
+            <a:avLst/>
+          </a:prstGeom>
+        </p:spPr>
+        <p:txBody>
+          <a:bodyPr vert="horz" lIns="91440" tIns="45720" rIns="91440" bIns="45720" rtlCol="0" anchor="b"/>
+          <a:lstStyle>
+            <a:lvl1pPr algn="r">
+              <a:defRPr sz="1200"/>
+            </a:lvl1pPr>
+          </a:lstStyle>
+          <a:p>
+            <a:fld id="{18DD1664-3895-A742-AD37-B487C7CC08B8}" type="slidenum">
+              <a:rPr lang="en-US" smtClean="0"/>
+              <a:t>‹#›</a:t>
+            </a:fld>
+            <a:endParaRPr lang="en-US"/>
+          </a:p>
+        </p:txBody>
+      </p:sp>
+    </p:spTree>
+    <p:extLst>
+      <p:ext uri="{BB962C8B-B14F-4D97-AF65-F5344CB8AC3E}">
+        <p14:creationId xmlns:p14="http://schemas.microsoft.com/office/powerpoint/2010/main" val="2937791166"/>
+      </p:ext>
+    </p:extLst>
+  </p:cSld>
+  <p:clrMap bg1="lt1" tx1="dk1" bg2="lt2" tx2="dk2" accent1="accent1" accent2="accent2" accent3="accent3" accent4="accent4" accent5="accent5" accent6="accent6" hlink="hlink" folHlink="folHlink"/>
+  <p:notesStyle>
+    <a:lvl1pPr marL="0" algn="l" defTabSz="457200" rtl="0" eaLnBrk="1" latinLnBrk="0" hangingPunct="1">
+      <a:defRPr sz="1200" kern="1200">
+        <a:solidFill>
+          <a:schemeClr val="tx1"/>
+        </a:solidFill>
+        <a:latin typeface="+mn-lt"/>
+        <a:ea typeface="+mn-ea"/>
+        <a:cs typeface="+mn-cs"/>
+      </a:defRPr>
+    </a:lvl1pPr>
+    <a:lvl2pPr marL="457200" algn="l" defTabSz="457200" rtl="0" eaLnBrk="1" latinLnBrk="0" hangingPunct="1">
+      <a:defRPr sz="1200" kern="1200">
+        <a:solidFill>
+          <a:schemeClr val="tx1"/>
+        </a:solidFill>
+        <a:latin typeface="+mn-lt"/>
+        <a:ea typeface="+mn-ea"/>
+        <a:cs typeface="+mn-cs"/>
+      </a:defRPr>
+    </a:lvl2pPr>
+    <a:lvl3pPr marL="914400" algn="l" defTabSz="457200" rtl="0" eaLnBrk="1" latinLnBrk="0" hangingPunct="1">
+      <a:defRPr sz="1200" kern="1200">
+        <a:solidFill>
+          <a:schemeClr val="tx1"/>
+        </a:solidFill>
+        <a:latin typeface="+mn-lt"/>
+        <a:ea typeface="+mn-ea"/>
+        <a:cs typeface="+mn-cs"/>
+      </a:defRPr>
+    </a:lvl3pPr>
+    <a:lvl4pPr marL="1371600" algn="l" defTabSz="457200" rtl="0" eaLnBrk="1" latinLnBrk="0" hangingPunct="1">
+      <a:defRPr sz="1200" kern="1200">
+        <a:solidFill>
+          <a:schemeClr val="tx1"/>
+        </a:solidFill>
+        <a:latin typeface="+mn-lt"/>
+        <a:ea typeface="+mn-ea"/>
+        <a:cs typeface="+mn-cs"/>
+      </a:defRPr>
+    </a:lvl4pPr>
+    <a:lvl5pPr marL="1828800" algn="l" defTabSz="457200" rtl="0" eaLnBrk="1" latinLnBrk="0" hangingPunct="1">
+      <a:defRPr sz="1200" kern="1200">
+        <a:solidFill>
+          <a:schemeClr val="tx1"/>
+        </a:solidFill>
+        <a:latin typeface="+mn-lt"/>
+        <a:ea typeface="+mn-ea"/>
+        <a:cs typeface="+mn-cs"/>
+      </a:defRPr>
+    </a:lvl5pPr>
+    <a:lvl6pPr marL="2286000" algn="l" defTabSz="457200" rtl="0" eaLnBrk="1" latinLnBrk="0" hangingPunct="1">
+      <a:defRPr sz="1200" kern="1200">
+        <a:solidFill>
+          <a:schemeClr val="tx1"/>
+        </a:solidFill>
+        <a:latin typeface="+mn-lt"/>
+        <a:ea typeface="+mn-ea"/>
+        <a:cs typeface="+mn-cs"/>
+      </a:defRPr>
+    </a:lvl6pPr>
+    <a:lvl7pPr marL="2743200" algn="l" defTabSz="457200" rtl="0" eaLnBrk="1" latinLnBrk="0" hangingPunct="1">
+      <a:defRPr sz="1200" kern="1200">
+        <a:solidFill>
+          <a:schemeClr val="tx1"/>
+        </a:solidFill>
+        <a:latin typeface="+mn-lt"/>
+        <a:ea typeface="+mn-ea"/>
+        <a:cs typeface="+mn-cs"/>
+      </a:defRPr>
+    </a:lvl7pPr>
+    <a:lvl8pPr marL="3200400" algn="l" defTabSz="457200" rtl="0" eaLnBrk="1" latinLnBrk="0" hangingPunct="1">
+      <a:defRPr sz="1200" kern="1200">
+        <a:solidFill>
+          <a:schemeClr val="tx1"/>
+        </a:solidFill>
+        <a:latin typeface="+mn-lt"/>
+        <a:ea typeface="+mn-ea"/>
+        <a:cs typeface="+mn-cs"/>
+      </a:defRPr>
+    </a:lvl8pPr>
+    <a:lvl9pPr marL="3657600" algn="l" defTabSz="457200" rtl="0" eaLnBrk="1" latinLnBrk="0" hangingPunct="1">
+      <a:defRPr sz="1200" kern="1200">
+        <a:solidFill>
+          <a:schemeClr val="tx1"/>
+        </a:solidFill>
+        <a:latin typeface="+mn-lt"/>
+        <a:ea typeface="+mn-ea"/>
+        <a:cs typeface="+mn-cs"/>
+      </a:defRPr>
+    </a:lvl9pPr>
+  </p:notesStyle>
+</p:notesMaster>
+</file>
+
+<file path=ppt/notesSlides/notesSlide1.xml><?xml version="1.0" encoding="utf-8"?>
+<p:notes xmlns:a="http://schemas.openxmlformats.org/drawingml/2006/main" xmlns:r="http://schemas.openxmlformats.org/officeDocument/2006/relationships" xmlns:p="http://schemas.openxmlformats.org/presentationml/2006/main">
+  <p:cSld>
+    <p:bg>
+      <p:bgPr>
+        <a:solidFill>
+          <a:srgbClr val="FFFFFF"/>
+        </a:solidFill>
+        <a:effectLst/>
+      </p:bgPr>
+    </p:bg>
+    <p:spTree>
+      <p:nvGrpSpPr>
+        <p:cNvPr id="1" name=""/>
+        <p:cNvGrpSpPr/>
+        <p:nvPr/>
+      </p:nvGrpSpPr>
+      <p:grpSpPr>
+        <a:xfrm>
+          <a:off x="0" y="0"/>
+          <a:ext cx="0" cy="0"/>
+          <a:chOff x="0" y="0"/>
+          <a:chExt cx="0" cy="0"/>
+        </a:xfrm>
+      </p:grpSpPr>
+      <p:sp>
+        <p:nvSpPr>
+          <p:cNvPr id="7" name="Rectangle 6"/>
+          <p:cNvSpPr>
+            <a:spLocks noGrp="1" noChangeArrowheads="1"/>
+          </p:cNvSpPr>
+          <p:nvPr>
+            <p:ph type="sldNum"/>
+          </p:nvPr>
+        </p:nvSpPr>
+        <p:spPr>
+          <a:ln/>
+        </p:spPr>
+        <p:txBody>
+          <a:bodyPr/>
+          <a:lstStyle/>
+          <a:p>
+            <a:fld id="{341DA1B4-C494-1141-A8B4-CC822528092B}" type="slidenum">
+              <a:rPr lang="en-US"/>
+              <a:pPr/>
+              <a:t>2</a:t>
+            </a:fld>
+            <a:endParaRPr lang="en-US"/>
+          </a:p>
+        </p:txBody>
+      </p:sp>
+      <p:sp>
+        <p:nvSpPr>
+          <p:cNvPr id="4097" name="Text Box 1"/>
+          <p:cNvSpPr txBox="1">
+            <a:spLocks noChangeArrowheads="1"/>
+          </p:cNvSpPr>
+          <p:nvPr>
+            <p:ph type="sldImg"/>
+          </p:nvPr>
+        </p:nvSpPr>
+        <p:spPr bwMode="auto">
+          <a:xfrm>
+            <a:off x="1557338" y="860425"/>
+            <a:ext cx="3933825" cy="2949575"/>
+          </a:xfrm>
+          <a:prstGeom prst="rect">
+            <a:avLst/>
+          </a:prstGeom>
+          <a:solidFill>
+            <a:srgbClr val="FFFFFF"/>
+          </a:solidFill>
+          <a:ln>
+            <a:solidFill>
+              <a:srgbClr val="000000"/>
+            </a:solidFill>
+            <a:miter lim="800000"/>
+            <a:headEnd/>
+            <a:tailEnd/>
+          </a:ln>
+          <a:extLst>
+            <a:ext uri="{AF507438-7753-43e0-B8FC-AC1667EBCBE1}">
+              <a14:hiddenEffects xmlns:a14="http://schemas.microsoft.com/office/drawing/2010/main">
+                <a:effectLst>
+                  <a:outerShdw blurRad="63500" dist="38099" dir="2700000" algn="ctr" rotWithShape="0">
+                    <a:srgbClr val="000000">
+                      <a:alpha val="74998"/>
+                    </a:srgbClr>
+                  </a:outerShdw>
+                </a:effectLst>
+              </a14:hiddenEffects>
+            </a:ext>
+          </a:extLst>
+        </p:spPr>
+      </p:sp>
+      <p:sp>
+        <p:nvSpPr>
+          <p:cNvPr id="4098" name="Text Box 2"/>
+          <p:cNvSpPr txBox="1">
+            <a:spLocks noChangeArrowheads="1"/>
+          </p:cNvSpPr>
+          <p:nvPr>
+            <p:ph type="body" idx="1"/>
+          </p:nvPr>
+        </p:nvSpPr>
+        <p:spPr bwMode="auto">
+          <a:xfrm>
+            <a:off x="1075794" y="4094774"/>
+            <a:ext cx="4905155" cy="4846931"/>
+          </a:xfrm>
+          <a:prstGeom prst="rect">
+            <a:avLst/>
+          </a:prstGeom>
+          <a:noFill/>
+          <a:ln/>
+          <a:extLst>
+            <a:ext uri="{909E8E84-426E-40dd-AFC4-6F175D3DCCD1}">
+              <a14:hiddenFill xmlns:a14="http://schemas.microsoft.com/office/drawing/2010/main">
+                <a:solidFill>
+                  <a:srgbClr val="FFFFFF"/>
+                </a:solidFill>
+              </a14:hiddenFill>
+            </a:ext>
+            <a:ext uri="{91240B29-F687-4f45-9708-019B960494DF}">
+              <a14:hiddenLine xmlns:a14="http://schemas.microsoft.com/office/drawing/2010/main" w="9525" cap="flat">
+                <a:solidFill>
+                  <a:srgbClr val="808080"/>
+                </a:solidFill>
+                <a:round/>
+                <a:headEnd/>
+                <a:tailEnd/>
+              </a14:hiddenLine>
+            </a:ext>
+            <a:ext uri="{AF507438-7753-43e0-B8FC-AC1667EBCBE1}">
+              <a14:hiddenEffects xmlns:a14="http://schemas.microsoft.com/office/drawing/2010/main">
+                <a:effectLst>
+                  <a:outerShdw blurRad="63500" dist="38099" dir="2700000" algn="ctr" rotWithShape="0">
+                    <a:srgbClr val="000000">
+                      <a:alpha val="74998"/>
+                    </a:srgbClr>
+                  </a:outerShdw>
+                </a:effectLst>
+              </a14:hiddenEffects>
+            </a:ext>
+          </a:extLst>
+        </p:spPr>
+        <p:txBody>
+          <a:bodyPr lIns="0" tIns="15465" rIns="0" bIns="0"/>
+          <a:lstStyle>
+            <a:lvl1pPr>
+              <a:tabLst>
+                <a:tab pos="723900" algn="l"/>
+                <a:tab pos="1447800" algn="l"/>
+                <a:tab pos="2171700" algn="l"/>
+                <a:tab pos="2895600" algn="l"/>
+                <a:tab pos="3619500" algn="l"/>
+                <a:tab pos="4343400" algn="l"/>
+                <a:tab pos="5067300" algn="l"/>
+              </a:tabLst>
+              <a:defRPr sz="1200">
+                <a:solidFill>
+                  <a:srgbClr val="000000"/>
+                </a:solidFill>
+                <a:latin typeface="Times New Roman" charset="0"/>
+                <a:ea typeface="ＭＳ Ｐゴシック" charset="0"/>
+              </a:defRPr>
+            </a:lvl1pPr>
+            <a:lvl2pPr>
+              <a:tabLst>
+                <a:tab pos="723900" algn="l"/>
+                <a:tab pos="1447800" algn="l"/>
+                <a:tab pos="2171700" algn="l"/>
+                <a:tab pos="2895600" algn="l"/>
+                <a:tab pos="3619500" algn="l"/>
+                <a:tab pos="4343400" algn="l"/>
+                <a:tab pos="5067300" algn="l"/>
+              </a:tabLst>
+              <a:defRPr sz="1200">
+                <a:solidFill>
+                  <a:srgbClr val="000000"/>
+                </a:solidFill>
+                <a:latin typeface="Times New Roman" charset="0"/>
+                <a:ea typeface="ＭＳ Ｐゴシック" charset="0"/>
+              </a:defRPr>
+            </a:lvl2pPr>
+            <a:lvl3pPr>
+              <a:tabLst>
+                <a:tab pos="723900" algn="l"/>
+                <a:tab pos="1447800" algn="l"/>
+                <a:tab pos="2171700" algn="l"/>
+                <a:tab pos="2895600" algn="l"/>
+                <a:tab pos="3619500" algn="l"/>
+                <a:tab pos="4343400" algn="l"/>
+                <a:tab pos="5067300" algn="l"/>
+              </a:tabLst>
+              <a:defRPr sz="1200">
+                <a:solidFill>
+                  <a:srgbClr val="000000"/>
+                </a:solidFill>
+                <a:latin typeface="Times New Roman" charset="0"/>
+                <a:ea typeface="ＭＳ Ｐゴシック" charset="0"/>
+              </a:defRPr>
+            </a:lvl3pPr>
+            <a:lvl4pPr>
+              <a:tabLst>
+                <a:tab pos="723900" algn="l"/>
+                <a:tab pos="1447800" algn="l"/>
+                <a:tab pos="2171700" algn="l"/>
+                <a:tab pos="2895600" algn="l"/>
+                <a:tab pos="3619500" algn="l"/>
+                <a:tab pos="4343400" algn="l"/>
+                <a:tab pos="5067300" algn="l"/>
+              </a:tabLst>
+              <a:defRPr sz="1200">
+                <a:solidFill>
+                  <a:srgbClr val="000000"/>
+                </a:solidFill>
+                <a:latin typeface="Times New Roman" charset="0"/>
+                <a:ea typeface="ＭＳ Ｐゴシック" charset="0"/>
+              </a:defRPr>
+            </a:lvl4pPr>
+            <a:lvl5pPr>
+              <a:tabLst>
+                <a:tab pos="723900" algn="l"/>
+                <a:tab pos="1447800" algn="l"/>
+                <a:tab pos="2171700" algn="l"/>
+                <a:tab pos="2895600" algn="l"/>
+                <a:tab pos="3619500" algn="l"/>
+                <a:tab pos="4343400" algn="l"/>
+                <a:tab pos="5067300" algn="l"/>
+              </a:tabLst>
+              <a:defRPr sz="1200">
+                <a:solidFill>
+                  <a:srgbClr val="000000"/>
+                </a:solidFill>
+                <a:latin typeface="Times New Roman" charset="0"/>
+                <a:ea typeface="ＭＳ Ｐゴシック" charset="0"/>
+              </a:defRPr>
+            </a:lvl5pPr>
+            <a:lvl6pPr marL="2514600" indent="-228600" eaLnBrk="0" fontAlgn="base" hangingPunct="0">
+              <a:spcBef>
+                <a:spcPct val="30000"/>
+              </a:spcBef>
+              <a:spcAft>
+                <a:spcPct val="0"/>
+              </a:spcAft>
+              <a:buClr>
+                <a:srgbClr val="000000"/>
+              </a:buClr>
+              <a:buSzPct val="100000"/>
+              <a:buFont typeface="Times New Roman" charset="0"/>
+              <a:tabLst>
+                <a:tab pos="723900" algn="l"/>
+                <a:tab pos="1447800" algn="l"/>
+                <a:tab pos="2171700" algn="l"/>
+                <a:tab pos="2895600" algn="l"/>
+                <a:tab pos="3619500" algn="l"/>
+                <a:tab pos="4343400" algn="l"/>
+                <a:tab pos="5067300" algn="l"/>
+              </a:tabLst>
+              <a:defRPr sz="1200">
+                <a:solidFill>
+                  <a:srgbClr val="000000"/>
+                </a:solidFill>
+                <a:latin typeface="Times New Roman" charset="0"/>
+                <a:ea typeface="ＭＳ Ｐゴシック" charset="0"/>
+              </a:defRPr>
+            </a:lvl6pPr>
+            <a:lvl7pPr marL="2971800" indent="-228600" eaLnBrk="0" fontAlgn="base" hangingPunct="0">
+              <a:spcBef>
+                <a:spcPct val="30000"/>
+              </a:spcBef>
+              <a:spcAft>
+                <a:spcPct val="0"/>
+              </a:spcAft>
+              <a:buClr>
+                <a:srgbClr val="000000"/>
+              </a:buClr>
+              <a:buSzPct val="100000"/>
+              <a:buFont typeface="Times New Roman" charset="0"/>
+              <a:tabLst>
+                <a:tab pos="723900" algn="l"/>
+                <a:tab pos="1447800" algn="l"/>
+                <a:tab pos="2171700" algn="l"/>
+                <a:tab pos="2895600" algn="l"/>
+                <a:tab pos="3619500" algn="l"/>
+                <a:tab pos="4343400" algn="l"/>
+                <a:tab pos="5067300" algn="l"/>
+              </a:tabLst>
+              <a:defRPr sz="1200">
+                <a:solidFill>
+                  <a:srgbClr val="000000"/>
+                </a:solidFill>
+                <a:latin typeface="Times New Roman" charset="0"/>
+                <a:ea typeface="ＭＳ Ｐゴシック" charset="0"/>
+              </a:defRPr>
+            </a:lvl7pPr>
+            <a:lvl8pPr marL="3429000" indent="-228600" eaLnBrk="0" fontAlgn="base" hangingPunct="0">
+              <a:spcBef>
+                <a:spcPct val="30000"/>
+              </a:spcBef>
+              <a:spcAft>
+                <a:spcPct val="0"/>
+              </a:spcAft>
+              <a:buClr>
+                <a:srgbClr val="000000"/>
+              </a:buClr>
+              <a:buSzPct val="100000"/>
+              <a:buFont typeface="Times New Roman" charset="0"/>
+              <a:tabLst>
+                <a:tab pos="723900" algn="l"/>
+                <a:tab pos="1447800" algn="l"/>
+                <a:tab pos="2171700" algn="l"/>
+                <a:tab pos="2895600" algn="l"/>
+                <a:tab pos="3619500" algn="l"/>
+                <a:tab pos="4343400" algn="l"/>
+                <a:tab pos="5067300" algn="l"/>
+              </a:tabLst>
+              <a:defRPr sz="1200">
+                <a:solidFill>
+                  <a:srgbClr val="000000"/>
+                </a:solidFill>
+                <a:latin typeface="Times New Roman" charset="0"/>
+                <a:ea typeface="ＭＳ Ｐゴシック" charset="0"/>
+              </a:defRPr>
+            </a:lvl8pPr>
+            <a:lvl9pPr marL="3886200" indent="-228600" eaLnBrk="0" fontAlgn="base" hangingPunct="0">
+              <a:spcBef>
+                <a:spcPct val="30000"/>
+              </a:spcBef>
+              <a:spcAft>
+                <a:spcPct val="0"/>
+              </a:spcAft>
+              <a:buClr>
+                <a:srgbClr val="000000"/>
+              </a:buClr>
+              <a:buSzPct val="100000"/>
+              <a:buFont typeface="Times New Roman" charset="0"/>
+              <a:tabLst>
+                <a:tab pos="723900" algn="l"/>
+                <a:tab pos="1447800" algn="l"/>
+                <a:tab pos="2171700" algn="l"/>
+                <a:tab pos="2895600" algn="l"/>
+                <a:tab pos="3619500" algn="l"/>
+                <a:tab pos="4343400" algn="l"/>
+                <a:tab pos="5067300" algn="l"/>
+              </a:tabLst>
+              <a:defRPr sz="1200">
+                <a:solidFill>
+                  <a:srgbClr val="000000"/>
+                </a:solidFill>
+                <a:latin typeface="Times New Roman" charset="0"/>
+                <a:ea typeface="ＭＳ Ｐゴシック" charset="0"/>
+              </a:defRPr>
+            </a:lvl9pPr>
+          </a:lstStyle>
+          <a:p>
+            <a:pPr marL="189280" indent="-187888">
+              <a:lnSpc>
+                <a:spcPct val="93000"/>
+              </a:lnSpc>
+              <a:spcBef>
+                <a:spcPct val="0"/>
+              </a:spcBef>
+            </a:pPr>
+            <a:r>
+              <a:rPr lang="en-US" sz="1800">
+                <a:latin typeface="Arial" charset="0"/>
+                <a:cs typeface="Baekmuk Gulim" charset="0"/>
+              </a:rPr>
+              <a:t>The percentage of research articles using R in the 30 main ecology journals from 2008 to 2017. Data were from over 60,000 articles with methods inspected for reported R use.</a:t>
+            </a:r>
+          </a:p>
+          <a:p>
+            <a:pPr marL="189280" indent="-187888">
+              <a:lnSpc>
+                <a:spcPct val="93000"/>
+              </a:lnSpc>
+              <a:spcBef>
+                <a:spcPct val="0"/>
+              </a:spcBef>
+            </a:pPr>
+            <a:r>
+              <a:rPr lang="en-US" sz="1800">
+                <a:latin typeface="Arial" charset="0"/>
+                <a:cs typeface="Baekmuk Gulim" charset="0"/>
+              </a:rPr>
+              <a:t>IF THIS IMAGE HAS BEEN PROVIDED BY OR IS OWNED BY A THIRD PARTY, AS INDICATED IN THE CAPTION LINE, THEN FURTHER PERMISSION MAY BE NEEDED BEFORE ANY FURTHER USE. PLEASE CONTACT WILEY'S PERMISSIONS DEPARTMENT ON PERMISSIONS@WILEY.COM OR USE THE RIGHTSLINK SERVICE BY CLICKING ON THE 'REQUEST PERMISSIONS' LINK ACCOMPANYING THIS ARTICLE. WILEY OR AUTHOR OWNED IMAGES MAY BE USED FOR NON-COMMERCIAL PURPOSES, SUBJECT TO PROPER CITATION OF THE ARTICLE, AUTHOR, AND PUBLISHER. </a:t>
+            </a:r>
+          </a:p>
+        </p:txBody>
+      </p:sp>
+    </p:spTree>
+  </p:cSld>
+  <p:clrMapOvr>
+    <a:masterClrMapping/>
+  </p:clrMapOvr>
+</p:notes>
+</file>
+
 <file path=ppt/slideLayouts/slideLayout1.xml><?xml version="1.0" encoding="utf-8"?>
 <p:sldLayout xmlns:a="http://schemas.openxmlformats.org/drawingml/2006/main" xmlns:r="http://schemas.openxmlformats.org/officeDocument/2006/relationships" xmlns:p="http://schemas.openxmlformats.org/presentationml/2006/main" type="title" preserve="1">
   <p:cSld name="Title Slide">
@@ -694,6 +1448,67 @@
     <p:extLst>
       <p:ext uri="{BB962C8B-B14F-4D97-AF65-F5344CB8AC3E}">
         <p14:creationId xmlns:p14="http://schemas.microsoft.com/office/powerpoint/2010/main" val="233463059"/>
+      </p:ext>
+    </p:extLst>
+  </p:cSld>
+  <p:clrMapOvr>
+    <a:masterClrMapping/>
+  </p:clrMapOvr>
+</p:sldLayout>
+</file>
+
+<file path=ppt/slideLayouts/slideLayout12.xml><?xml version="1.0" encoding="utf-8"?>
+<p:sldLayout xmlns:a="http://schemas.openxmlformats.org/drawingml/2006/main" xmlns:r="http://schemas.openxmlformats.org/officeDocument/2006/relationships" xmlns:p="http://schemas.openxmlformats.org/presentationml/2006/main">
+  <p:cSld name="Custom Layout">
+    <p:spTree>
+      <p:nvGrpSpPr>
+        <p:cNvPr id="1" name=""/>
+        <p:cNvGrpSpPr/>
+        <p:nvPr/>
+      </p:nvGrpSpPr>
+      <p:grpSpPr>
+        <a:xfrm>
+          <a:off x="0" y="0"/>
+          <a:ext cx="0" cy="0"/>
+          <a:chOff x="0" y="0"/>
+          <a:chExt cx="0" cy="0"/>
+        </a:xfrm>
+      </p:grpSpPr>
+      <p:sp>
+        <p:nvSpPr>
+          <p:cNvPr id="2" name="Title 1"/>
+          <p:cNvSpPr>
+            <a:spLocks noGrp="1"/>
+          </p:cNvSpPr>
+          <p:nvPr>
+            <p:ph type="title"/>
+          </p:nvPr>
+        </p:nvSpPr>
+        <p:spPr>
+          <a:xfrm>
+            <a:off x="457200" y="274638"/>
+            <a:ext cx="8229600" cy="1143000"/>
+          </a:xfrm>
+          <a:prstGeom prst="rect">
+            <a:avLst/>
+          </a:prstGeom>
+        </p:spPr>
+        <p:txBody>
+          <a:bodyPr vert="horz"/>
+          <a:lstStyle/>
+          <a:p>
+            <a:r>
+              <a:rPr lang="en-CA" smtClean="0"/>
+              <a:t>Click to edit Master title style</a:t>
+            </a:r>
+            <a:endParaRPr lang="en-US"/>
+          </a:p>
+        </p:txBody>
+      </p:sp>
+    </p:spTree>
+    <p:extLst>
+      <p:ext uri="{BB962C8B-B14F-4D97-AF65-F5344CB8AC3E}">
+        <p14:creationId xmlns:p14="http://schemas.microsoft.com/office/powerpoint/2010/main" val="3896592297"/>
       </p:ext>
     </p:extLst>
   </p:cSld>
@@ -2828,6 +3643,7 @@
     <p:sldLayoutId id="2147483657" r:id="rId9"/>
     <p:sldLayoutId id="2147483658" r:id="rId10"/>
     <p:sldLayoutId id="2147483659" r:id="rId11"/>
+    <p:sldLayoutId id="2147483660" r:id="rId12"/>
   </p:sldLayoutIdLst>
   <p:txStyles>
     <p:titleStyle>
@@ -3189,6 +4005,848 @@
           <a:chExt cx="0" cy="0"/>
         </a:xfrm>
       </p:grpSpPr>
+      <p:sp>
+        <p:nvSpPr>
+          <p:cNvPr id="3073" name="Text Box 1"/>
+          <p:cNvSpPr txBox="1">
+            <a:spLocks noChangeArrowheads="1"/>
+          </p:cNvSpPr>
+          <p:nvPr/>
+        </p:nvSpPr>
+        <p:spPr bwMode="auto">
+          <a:xfrm>
+            <a:off x="2469973" y="1550835"/>
+            <a:ext cx="7199313" cy="261938"/>
+          </a:xfrm>
+          <a:prstGeom prst="rect">
+            <a:avLst/>
+          </a:prstGeom>
+          <a:noFill/>
+          <a:ln>
+            <a:noFill/>
+          </a:ln>
+          <a:effectLst/>
+          <a:extLst>
+            <a:ext uri="{909E8E84-426E-40dd-AFC4-6F175D3DCCD1}">
+              <a14:hiddenFill xmlns:a14="http://schemas.microsoft.com/office/drawing/2010/main">
+                <a:solidFill>
+                  <a:srgbClr val="FFFFFF"/>
+                </a:solidFill>
+              </a14:hiddenFill>
+            </a:ext>
+            <a:ext uri="{91240B29-F687-4f45-9708-019B960494DF}">
+              <a14:hiddenLine xmlns:a14="http://schemas.microsoft.com/office/drawing/2010/main" w="9525" cap="flat">
+                <a:solidFill>
+                  <a:srgbClr val="000000"/>
+                </a:solidFill>
+                <a:round/>
+                <a:headEnd/>
+                <a:tailEnd/>
+              </a14:hiddenLine>
+            </a:ext>
+            <a:ext uri="{AF507438-7753-43e0-B8FC-AC1667EBCBE1}">
+              <a14:hiddenEffects xmlns:a14="http://schemas.microsoft.com/office/drawing/2010/main">
+                <a:effectLst>
+                  <a:outerShdw blurRad="63500" dist="38099" dir="2700000" algn="ctr" rotWithShape="0">
+                    <a:srgbClr val="000000">
+                      <a:alpha val="74998"/>
+                    </a:srgbClr>
+                  </a:outerShdw>
+                </a:effectLst>
+              </a14:hiddenEffects>
+            </a:ext>
+          </a:extLst>
+        </p:spPr>
+        <p:txBody>
+          <a:bodyPr lIns="90000" tIns="46800" rIns="90000" bIns="46800"/>
+          <a:lstStyle>
+            <a:lvl1pPr>
+              <a:tabLst>
+                <a:tab pos="723900" algn="l"/>
+                <a:tab pos="1447800" algn="l"/>
+                <a:tab pos="2171700" algn="l"/>
+                <a:tab pos="2895600" algn="l"/>
+                <a:tab pos="3619500" algn="l"/>
+                <a:tab pos="4343400" algn="l"/>
+                <a:tab pos="5067300" algn="l"/>
+                <a:tab pos="5791200" algn="l"/>
+                <a:tab pos="6515100" algn="l"/>
+              </a:tabLst>
+              <a:defRPr sz="1400">
+                <a:solidFill>
+                  <a:srgbClr val="000000"/>
+                </a:solidFill>
+                <a:latin typeface="Arial" charset="0"/>
+                <a:ea typeface="ＭＳ Ｐゴシック" charset="0"/>
+                <a:cs typeface="ＭＳ Ｐゴシック" charset="0"/>
+              </a:defRPr>
+            </a:lvl1pPr>
+            <a:lvl2pPr>
+              <a:tabLst>
+                <a:tab pos="723900" algn="l"/>
+                <a:tab pos="1447800" algn="l"/>
+                <a:tab pos="2171700" algn="l"/>
+                <a:tab pos="2895600" algn="l"/>
+                <a:tab pos="3619500" algn="l"/>
+                <a:tab pos="4343400" algn="l"/>
+                <a:tab pos="5067300" algn="l"/>
+                <a:tab pos="5791200" algn="l"/>
+                <a:tab pos="6515100" algn="l"/>
+              </a:tabLst>
+              <a:defRPr sz="1400">
+                <a:solidFill>
+                  <a:srgbClr val="000000"/>
+                </a:solidFill>
+                <a:latin typeface="Arial" charset="0"/>
+                <a:ea typeface="ＭＳ Ｐゴシック" charset="0"/>
+                <a:cs typeface="ＭＳ Ｐゴシック" charset="0"/>
+              </a:defRPr>
+            </a:lvl2pPr>
+            <a:lvl3pPr>
+              <a:tabLst>
+                <a:tab pos="723900" algn="l"/>
+                <a:tab pos="1447800" algn="l"/>
+                <a:tab pos="2171700" algn="l"/>
+                <a:tab pos="2895600" algn="l"/>
+                <a:tab pos="3619500" algn="l"/>
+                <a:tab pos="4343400" algn="l"/>
+                <a:tab pos="5067300" algn="l"/>
+                <a:tab pos="5791200" algn="l"/>
+                <a:tab pos="6515100" algn="l"/>
+              </a:tabLst>
+              <a:defRPr sz="1400">
+                <a:solidFill>
+                  <a:srgbClr val="000000"/>
+                </a:solidFill>
+                <a:latin typeface="Arial" charset="0"/>
+                <a:ea typeface="ＭＳ Ｐゴシック" charset="0"/>
+                <a:cs typeface="ＭＳ Ｐゴシック" charset="0"/>
+              </a:defRPr>
+            </a:lvl3pPr>
+            <a:lvl4pPr>
+              <a:tabLst>
+                <a:tab pos="723900" algn="l"/>
+                <a:tab pos="1447800" algn="l"/>
+                <a:tab pos="2171700" algn="l"/>
+                <a:tab pos="2895600" algn="l"/>
+                <a:tab pos="3619500" algn="l"/>
+                <a:tab pos="4343400" algn="l"/>
+                <a:tab pos="5067300" algn="l"/>
+                <a:tab pos="5791200" algn="l"/>
+                <a:tab pos="6515100" algn="l"/>
+              </a:tabLst>
+              <a:defRPr sz="1400">
+                <a:solidFill>
+                  <a:srgbClr val="000000"/>
+                </a:solidFill>
+                <a:latin typeface="Arial" charset="0"/>
+                <a:ea typeface="ＭＳ Ｐゴシック" charset="0"/>
+                <a:cs typeface="ＭＳ Ｐゴシック" charset="0"/>
+              </a:defRPr>
+            </a:lvl4pPr>
+            <a:lvl5pPr>
+              <a:tabLst>
+                <a:tab pos="723900" algn="l"/>
+                <a:tab pos="1447800" algn="l"/>
+                <a:tab pos="2171700" algn="l"/>
+                <a:tab pos="2895600" algn="l"/>
+                <a:tab pos="3619500" algn="l"/>
+                <a:tab pos="4343400" algn="l"/>
+                <a:tab pos="5067300" algn="l"/>
+                <a:tab pos="5791200" algn="l"/>
+                <a:tab pos="6515100" algn="l"/>
+              </a:tabLst>
+              <a:defRPr sz="1400">
+                <a:solidFill>
+                  <a:srgbClr val="000000"/>
+                </a:solidFill>
+                <a:latin typeface="Arial" charset="0"/>
+                <a:ea typeface="ＭＳ Ｐゴシック" charset="0"/>
+                <a:cs typeface="ＭＳ Ｐゴシック" charset="0"/>
+              </a:defRPr>
+            </a:lvl5pPr>
+            <a:lvl6pPr marL="2514600" indent="-228600" fontAlgn="base">
+              <a:spcBef>
+                <a:spcPct val="0"/>
+              </a:spcBef>
+              <a:spcAft>
+                <a:spcPct val="0"/>
+              </a:spcAft>
+              <a:buClr>
+                <a:srgbClr val="000000"/>
+              </a:buClr>
+              <a:buSzPct val="100000"/>
+              <a:buFont typeface="Times New Roman" charset="0"/>
+              <a:tabLst>
+                <a:tab pos="723900" algn="l"/>
+                <a:tab pos="1447800" algn="l"/>
+                <a:tab pos="2171700" algn="l"/>
+                <a:tab pos="2895600" algn="l"/>
+                <a:tab pos="3619500" algn="l"/>
+                <a:tab pos="4343400" algn="l"/>
+                <a:tab pos="5067300" algn="l"/>
+                <a:tab pos="5791200" algn="l"/>
+                <a:tab pos="6515100" algn="l"/>
+              </a:tabLst>
+              <a:defRPr sz="1400">
+                <a:solidFill>
+                  <a:srgbClr val="000000"/>
+                </a:solidFill>
+                <a:latin typeface="Arial" charset="0"/>
+                <a:ea typeface="ＭＳ Ｐゴシック" charset="0"/>
+                <a:cs typeface="ＭＳ Ｐゴシック" charset="0"/>
+              </a:defRPr>
+            </a:lvl6pPr>
+            <a:lvl7pPr marL="2971800" indent="-228600" fontAlgn="base">
+              <a:spcBef>
+                <a:spcPct val="0"/>
+              </a:spcBef>
+              <a:spcAft>
+                <a:spcPct val="0"/>
+              </a:spcAft>
+              <a:buClr>
+                <a:srgbClr val="000000"/>
+              </a:buClr>
+              <a:buSzPct val="100000"/>
+              <a:buFont typeface="Times New Roman" charset="0"/>
+              <a:tabLst>
+                <a:tab pos="723900" algn="l"/>
+                <a:tab pos="1447800" algn="l"/>
+                <a:tab pos="2171700" algn="l"/>
+                <a:tab pos="2895600" algn="l"/>
+                <a:tab pos="3619500" algn="l"/>
+                <a:tab pos="4343400" algn="l"/>
+                <a:tab pos="5067300" algn="l"/>
+                <a:tab pos="5791200" algn="l"/>
+                <a:tab pos="6515100" algn="l"/>
+              </a:tabLst>
+              <a:defRPr sz="1400">
+                <a:solidFill>
+                  <a:srgbClr val="000000"/>
+                </a:solidFill>
+                <a:latin typeface="Arial" charset="0"/>
+                <a:ea typeface="ＭＳ Ｐゴシック" charset="0"/>
+                <a:cs typeface="ＭＳ Ｐゴシック" charset="0"/>
+              </a:defRPr>
+            </a:lvl7pPr>
+            <a:lvl8pPr marL="3429000" indent="-228600" fontAlgn="base">
+              <a:spcBef>
+                <a:spcPct val="0"/>
+              </a:spcBef>
+              <a:spcAft>
+                <a:spcPct val="0"/>
+              </a:spcAft>
+              <a:buClr>
+                <a:srgbClr val="000000"/>
+              </a:buClr>
+              <a:buSzPct val="100000"/>
+              <a:buFont typeface="Times New Roman" charset="0"/>
+              <a:tabLst>
+                <a:tab pos="723900" algn="l"/>
+                <a:tab pos="1447800" algn="l"/>
+                <a:tab pos="2171700" algn="l"/>
+                <a:tab pos="2895600" algn="l"/>
+                <a:tab pos="3619500" algn="l"/>
+                <a:tab pos="4343400" algn="l"/>
+                <a:tab pos="5067300" algn="l"/>
+                <a:tab pos="5791200" algn="l"/>
+                <a:tab pos="6515100" algn="l"/>
+              </a:tabLst>
+              <a:defRPr sz="1400">
+                <a:solidFill>
+                  <a:srgbClr val="000000"/>
+                </a:solidFill>
+                <a:latin typeface="Arial" charset="0"/>
+                <a:ea typeface="ＭＳ Ｐゴシック" charset="0"/>
+                <a:cs typeface="ＭＳ Ｐゴシック" charset="0"/>
+              </a:defRPr>
+            </a:lvl8pPr>
+            <a:lvl9pPr marL="3886200" indent="-228600" fontAlgn="base">
+              <a:spcBef>
+                <a:spcPct val="0"/>
+              </a:spcBef>
+              <a:spcAft>
+                <a:spcPct val="0"/>
+              </a:spcAft>
+              <a:buClr>
+                <a:srgbClr val="000000"/>
+              </a:buClr>
+              <a:buSzPct val="100000"/>
+              <a:buFont typeface="Times New Roman" charset="0"/>
+              <a:tabLst>
+                <a:tab pos="723900" algn="l"/>
+                <a:tab pos="1447800" algn="l"/>
+                <a:tab pos="2171700" algn="l"/>
+                <a:tab pos="2895600" algn="l"/>
+                <a:tab pos="3619500" algn="l"/>
+                <a:tab pos="4343400" algn="l"/>
+                <a:tab pos="5067300" algn="l"/>
+                <a:tab pos="5791200" algn="l"/>
+                <a:tab pos="6515100" algn="l"/>
+              </a:tabLst>
+              <a:defRPr sz="1400">
+                <a:solidFill>
+                  <a:srgbClr val="000000"/>
+                </a:solidFill>
+                <a:latin typeface="Arial" charset="0"/>
+                <a:ea typeface="ＭＳ Ｐゴシック" charset="0"/>
+                <a:cs typeface="ＭＳ Ｐゴシック" charset="0"/>
+              </a:defRPr>
+            </a:lvl9pPr>
+          </a:lstStyle>
+          <a:p>
+            <a:r>
+              <a:rPr lang="en-US" sz="2000" dirty="0"/>
+              <a:t>Evaluating the popularity of R in ecology</a:t>
+            </a:r>
+          </a:p>
+        </p:txBody>
+      </p:sp>
+      <p:sp>
+        <p:nvSpPr>
+          <p:cNvPr id="3074" name="AutoShape 2"/>
+          <p:cNvSpPr>
+            <a:spLocks noChangeAspect="1" noChangeArrowheads="1"/>
+          </p:cNvSpPr>
+          <p:nvPr/>
+        </p:nvSpPr>
+        <p:spPr bwMode="auto">
+          <a:xfrm>
+            <a:off x="4926013" y="152400"/>
+            <a:ext cx="3670300" cy="355600"/>
+          </a:xfrm>
+          <a:prstGeom prst="rect">
+            <a:avLst/>
+          </a:prstGeom>
+          <a:noFill/>
+          <a:ln>
+            <a:noFill/>
+          </a:ln>
+          <a:effectLst/>
+          <a:extLst>
+            <a:ext uri="{909E8E84-426E-40dd-AFC4-6F175D3DCCD1}">
+              <a14:hiddenFill xmlns:a14="http://schemas.microsoft.com/office/drawing/2010/main">
+                <a:blipFill dpi="0" rotWithShape="0">
+                  <a:blip/>
+                  <a:srcRect/>
+                  <a:stretch>
+                    <a:fillRect/>
+                  </a:stretch>
+                </a:blipFill>
+              </a14:hiddenFill>
+            </a:ext>
+            <a:ext uri="{91240B29-F687-4f45-9708-019B960494DF}">
+              <a14:hiddenLine xmlns:a14="http://schemas.microsoft.com/office/drawing/2010/main" w="9525" cap="flat">
+                <a:solidFill>
+                  <a:srgbClr val="000000"/>
+                </a:solidFill>
+                <a:round/>
+                <a:headEnd/>
+                <a:tailEnd/>
+              </a14:hiddenLine>
+            </a:ext>
+            <a:ext uri="{AF507438-7753-43e0-B8FC-AC1667EBCBE1}">
+              <a14:hiddenEffects xmlns:a14="http://schemas.microsoft.com/office/drawing/2010/main">
+                <a:effectLst>
+                  <a:outerShdw blurRad="63500" dist="38099" dir="2700000" algn="ctr" rotWithShape="0">
+                    <a:srgbClr val="000000">
+                      <a:alpha val="74998"/>
+                    </a:srgbClr>
+                  </a:outerShdw>
+                </a:effectLst>
+              </a14:hiddenEffects>
+            </a:ext>
+          </a:extLst>
+        </p:spPr>
+        <p:txBody>
+          <a:bodyPr wrap="none" anchor="ctr"/>
+          <a:lstStyle/>
+          <a:p>
+            <a:endParaRPr lang="en-US"/>
+          </a:p>
+        </p:txBody>
+      </p:sp>
+      <p:sp>
+        <p:nvSpPr>
+          <p:cNvPr id="3075" name="Text Box 3"/>
+          <p:cNvSpPr txBox="1">
+            <a:spLocks noChangeArrowheads="1"/>
+          </p:cNvSpPr>
+          <p:nvPr/>
+        </p:nvSpPr>
+        <p:spPr bwMode="auto">
+          <a:xfrm>
+            <a:off x="360363" y="5940425"/>
+            <a:ext cx="8640762" cy="212725"/>
+          </a:xfrm>
+          <a:prstGeom prst="rect">
+            <a:avLst/>
+          </a:prstGeom>
+          <a:noFill/>
+          <a:ln>
+            <a:noFill/>
+          </a:ln>
+          <a:effectLst/>
+          <a:extLst>
+            <a:ext uri="{909E8E84-426E-40dd-AFC4-6F175D3DCCD1}">
+              <a14:hiddenFill xmlns:a14="http://schemas.microsoft.com/office/drawing/2010/main">
+                <a:solidFill>
+                  <a:srgbClr val="FFFFFF"/>
+                </a:solidFill>
+              </a14:hiddenFill>
+            </a:ext>
+            <a:ext uri="{91240B29-F687-4f45-9708-019B960494DF}">
+              <a14:hiddenLine xmlns:a14="http://schemas.microsoft.com/office/drawing/2010/main" w="9525" cap="flat">
+                <a:solidFill>
+                  <a:srgbClr val="000000"/>
+                </a:solidFill>
+                <a:round/>
+                <a:headEnd/>
+                <a:tailEnd/>
+              </a14:hiddenLine>
+            </a:ext>
+            <a:ext uri="{AF507438-7753-43e0-B8FC-AC1667EBCBE1}">
+              <a14:hiddenEffects xmlns:a14="http://schemas.microsoft.com/office/drawing/2010/main">
+                <a:effectLst>
+                  <a:outerShdw blurRad="63500" dist="38099" dir="2700000" algn="ctr" rotWithShape="0">
+                    <a:srgbClr val="000000">
+                      <a:alpha val="74998"/>
+                    </a:srgbClr>
+                  </a:outerShdw>
+                </a:effectLst>
+              </a14:hiddenEffects>
+            </a:ext>
+          </a:extLst>
+        </p:spPr>
+        <p:txBody>
+          <a:bodyPr lIns="90000" tIns="45000" rIns="90000" bIns="45000"/>
+          <a:lstStyle>
+            <a:lvl1pPr>
+              <a:tabLst>
+                <a:tab pos="723900" algn="l"/>
+                <a:tab pos="1447800" algn="l"/>
+                <a:tab pos="2171700" algn="l"/>
+                <a:tab pos="2895600" algn="l"/>
+                <a:tab pos="3619500" algn="l"/>
+                <a:tab pos="4343400" algn="l"/>
+                <a:tab pos="5067300" algn="l"/>
+                <a:tab pos="5791200" algn="l"/>
+                <a:tab pos="6515100" algn="l"/>
+                <a:tab pos="7239000" algn="l"/>
+                <a:tab pos="7962900" algn="l"/>
+              </a:tabLst>
+              <a:defRPr sz="1400">
+                <a:solidFill>
+                  <a:srgbClr val="000000"/>
+                </a:solidFill>
+                <a:latin typeface="Arial" charset="0"/>
+                <a:ea typeface="ＭＳ Ｐゴシック" charset="0"/>
+                <a:cs typeface="ＭＳ Ｐゴシック" charset="0"/>
+              </a:defRPr>
+            </a:lvl1pPr>
+            <a:lvl2pPr>
+              <a:tabLst>
+                <a:tab pos="723900" algn="l"/>
+                <a:tab pos="1447800" algn="l"/>
+                <a:tab pos="2171700" algn="l"/>
+                <a:tab pos="2895600" algn="l"/>
+                <a:tab pos="3619500" algn="l"/>
+                <a:tab pos="4343400" algn="l"/>
+                <a:tab pos="5067300" algn="l"/>
+                <a:tab pos="5791200" algn="l"/>
+                <a:tab pos="6515100" algn="l"/>
+                <a:tab pos="7239000" algn="l"/>
+                <a:tab pos="7962900" algn="l"/>
+              </a:tabLst>
+              <a:defRPr sz="1400">
+                <a:solidFill>
+                  <a:srgbClr val="000000"/>
+                </a:solidFill>
+                <a:latin typeface="Arial" charset="0"/>
+                <a:ea typeface="ＭＳ Ｐゴシック" charset="0"/>
+                <a:cs typeface="ＭＳ Ｐゴシック" charset="0"/>
+              </a:defRPr>
+            </a:lvl2pPr>
+            <a:lvl3pPr>
+              <a:tabLst>
+                <a:tab pos="723900" algn="l"/>
+                <a:tab pos="1447800" algn="l"/>
+                <a:tab pos="2171700" algn="l"/>
+                <a:tab pos="2895600" algn="l"/>
+                <a:tab pos="3619500" algn="l"/>
+                <a:tab pos="4343400" algn="l"/>
+                <a:tab pos="5067300" algn="l"/>
+                <a:tab pos="5791200" algn="l"/>
+                <a:tab pos="6515100" algn="l"/>
+                <a:tab pos="7239000" algn="l"/>
+                <a:tab pos="7962900" algn="l"/>
+              </a:tabLst>
+              <a:defRPr sz="1400">
+                <a:solidFill>
+                  <a:srgbClr val="000000"/>
+                </a:solidFill>
+                <a:latin typeface="Arial" charset="0"/>
+                <a:ea typeface="ＭＳ Ｐゴシック" charset="0"/>
+                <a:cs typeface="ＭＳ Ｐゴシック" charset="0"/>
+              </a:defRPr>
+            </a:lvl3pPr>
+            <a:lvl4pPr>
+              <a:tabLst>
+                <a:tab pos="723900" algn="l"/>
+                <a:tab pos="1447800" algn="l"/>
+                <a:tab pos="2171700" algn="l"/>
+                <a:tab pos="2895600" algn="l"/>
+                <a:tab pos="3619500" algn="l"/>
+                <a:tab pos="4343400" algn="l"/>
+                <a:tab pos="5067300" algn="l"/>
+                <a:tab pos="5791200" algn="l"/>
+                <a:tab pos="6515100" algn="l"/>
+                <a:tab pos="7239000" algn="l"/>
+                <a:tab pos="7962900" algn="l"/>
+              </a:tabLst>
+              <a:defRPr sz="1400">
+                <a:solidFill>
+                  <a:srgbClr val="000000"/>
+                </a:solidFill>
+                <a:latin typeface="Arial" charset="0"/>
+                <a:ea typeface="ＭＳ Ｐゴシック" charset="0"/>
+                <a:cs typeface="ＭＳ Ｐゴシック" charset="0"/>
+              </a:defRPr>
+            </a:lvl4pPr>
+            <a:lvl5pPr>
+              <a:tabLst>
+                <a:tab pos="723900" algn="l"/>
+                <a:tab pos="1447800" algn="l"/>
+                <a:tab pos="2171700" algn="l"/>
+                <a:tab pos="2895600" algn="l"/>
+                <a:tab pos="3619500" algn="l"/>
+                <a:tab pos="4343400" algn="l"/>
+                <a:tab pos="5067300" algn="l"/>
+                <a:tab pos="5791200" algn="l"/>
+                <a:tab pos="6515100" algn="l"/>
+                <a:tab pos="7239000" algn="l"/>
+                <a:tab pos="7962900" algn="l"/>
+              </a:tabLst>
+              <a:defRPr sz="1400">
+                <a:solidFill>
+                  <a:srgbClr val="000000"/>
+                </a:solidFill>
+                <a:latin typeface="Arial" charset="0"/>
+                <a:ea typeface="ＭＳ Ｐゴシック" charset="0"/>
+                <a:cs typeface="ＭＳ Ｐゴシック" charset="0"/>
+              </a:defRPr>
+            </a:lvl5pPr>
+            <a:lvl6pPr marL="2514600" indent="-228600" fontAlgn="base">
+              <a:spcBef>
+                <a:spcPct val="0"/>
+              </a:spcBef>
+              <a:spcAft>
+                <a:spcPct val="0"/>
+              </a:spcAft>
+              <a:buClr>
+                <a:srgbClr val="000000"/>
+              </a:buClr>
+              <a:buSzPct val="100000"/>
+              <a:buFont typeface="Times New Roman" charset="0"/>
+              <a:tabLst>
+                <a:tab pos="723900" algn="l"/>
+                <a:tab pos="1447800" algn="l"/>
+                <a:tab pos="2171700" algn="l"/>
+                <a:tab pos="2895600" algn="l"/>
+                <a:tab pos="3619500" algn="l"/>
+                <a:tab pos="4343400" algn="l"/>
+                <a:tab pos="5067300" algn="l"/>
+                <a:tab pos="5791200" algn="l"/>
+                <a:tab pos="6515100" algn="l"/>
+                <a:tab pos="7239000" algn="l"/>
+                <a:tab pos="7962900" algn="l"/>
+              </a:tabLst>
+              <a:defRPr sz="1400">
+                <a:solidFill>
+                  <a:srgbClr val="000000"/>
+                </a:solidFill>
+                <a:latin typeface="Arial" charset="0"/>
+                <a:ea typeface="ＭＳ Ｐゴシック" charset="0"/>
+                <a:cs typeface="ＭＳ Ｐゴシック" charset="0"/>
+              </a:defRPr>
+            </a:lvl6pPr>
+            <a:lvl7pPr marL="2971800" indent="-228600" fontAlgn="base">
+              <a:spcBef>
+                <a:spcPct val="0"/>
+              </a:spcBef>
+              <a:spcAft>
+                <a:spcPct val="0"/>
+              </a:spcAft>
+              <a:buClr>
+                <a:srgbClr val="000000"/>
+              </a:buClr>
+              <a:buSzPct val="100000"/>
+              <a:buFont typeface="Times New Roman" charset="0"/>
+              <a:tabLst>
+                <a:tab pos="723900" algn="l"/>
+                <a:tab pos="1447800" algn="l"/>
+                <a:tab pos="2171700" algn="l"/>
+                <a:tab pos="2895600" algn="l"/>
+                <a:tab pos="3619500" algn="l"/>
+                <a:tab pos="4343400" algn="l"/>
+                <a:tab pos="5067300" algn="l"/>
+                <a:tab pos="5791200" algn="l"/>
+                <a:tab pos="6515100" algn="l"/>
+                <a:tab pos="7239000" algn="l"/>
+                <a:tab pos="7962900" algn="l"/>
+              </a:tabLst>
+              <a:defRPr sz="1400">
+                <a:solidFill>
+                  <a:srgbClr val="000000"/>
+                </a:solidFill>
+                <a:latin typeface="Arial" charset="0"/>
+                <a:ea typeface="ＭＳ Ｐゴシック" charset="0"/>
+                <a:cs typeface="ＭＳ Ｐゴシック" charset="0"/>
+              </a:defRPr>
+            </a:lvl7pPr>
+            <a:lvl8pPr marL="3429000" indent="-228600" fontAlgn="base">
+              <a:spcBef>
+                <a:spcPct val="0"/>
+              </a:spcBef>
+              <a:spcAft>
+                <a:spcPct val="0"/>
+              </a:spcAft>
+              <a:buClr>
+                <a:srgbClr val="000000"/>
+              </a:buClr>
+              <a:buSzPct val="100000"/>
+              <a:buFont typeface="Times New Roman" charset="0"/>
+              <a:tabLst>
+                <a:tab pos="723900" algn="l"/>
+                <a:tab pos="1447800" algn="l"/>
+                <a:tab pos="2171700" algn="l"/>
+                <a:tab pos="2895600" algn="l"/>
+                <a:tab pos="3619500" algn="l"/>
+                <a:tab pos="4343400" algn="l"/>
+                <a:tab pos="5067300" algn="l"/>
+                <a:tab pos="5791200" algn="l"/>
+                <a:tab pos="6515100" algn="l"/>
+                <a:tab pos="7239000" algn="l"/>
+                <a:tab pos="7962900" algn="l"/>
+              </a:tabLst>
+              <a:defRPr sz="1400">
+                <a:solidFill>
+                  <a:srgbClr val="000000"/>
+                </a:solidFill>
+                <a:latin typeface="Arial" charset="0"/>
+                <a:ea typeface="ＭＳ Ｐゴシック" charset="0"/>
+                <a:cs typeface="ＭＳ Ｐゴシック" charset="0"/>
+              </a:defRPr>
+            </a:lvl8pPr>
+            <a:lvl9pPr marL="3886200" indent="-228600" fontAlgn="base">
+              <a:spcBef>
+                <a:spcPct val="0"/>
+              </a:spcBef>
+              <a:spcAft>
+                <a:spcPct val="0"/>
+              </a:spcAft>
+              <a:buClr>
+                <a:srgbClr val="000000"/>
+              </a:buClr>
+              <a:buSzPct val="100000"/>
+              <a:buFont typeface="Times New Roman" charset="0"/>
+              <a:tabLst>
+                <a:tab pos="723900" algn="l"/>
+                <a:tab pos="1447800" algn="l"/>
+                <a:tab pos="2171700" algn="l"/>
+                <a:tab pos="2895600" algn="l"/>
+                <a:tab pos="3619500" algn="l"/>
+                <a:tab pos="4343400" algn="l"/>
+                <a:tab pos="5067300" algn="l"/>
+                <a:tab pos="5791200" algn="l"/>
+                <a:tab pos="6515100" algn="l"/>
+                <a:tab pos="7239000" algn="l"/>
+                <a:tab pos="7962900" algn="l"/>
+              </a:tabLst>
+              <a:defRPr sz="1400">
+                <a:solidFill>
+                  <a:srgbClr val="000000"/>
+                </a:solidFill>
+                <a:latin typeface="Arial" charset="0"/>
+                <a:ea typeface="ＭＳ Ｐゴシック" charset="0"/>
+                <a:cs typeface="ＭＳ Ｐゴシック" charset="0"/>
+              </a:defRPr>
+            </a:lvl9pPr>
+          </a:lstStyle>
+          <a:p>
+            <a:r>
+              <a:rPr lang="en-US" sz="800" b="1" dirty="0" smtClean="0">
+                <a:solidFill>
+                  <a:srgbClr val="0054A6"/>
+                </a:solidFill>
+              </a:rPr>
+              <a:t>Lai et al. Evaluating the population of R in ecology. Ecosphere</a:t>
+            </a:r>
+            <a:r>
+              <a:rPr lang="en-US" sz="800" b="1" dirty="0">
+                <a:solidFill>
+                  <a:srgbClr val="0054A6"/>
+                </a:solidFill>
+              </a:rPr>
+              <a:t>, Volume: 10, Issue: 1, First published: 11 January 2019, DOI: (10.1002/ecs2.2567) </a:t>
+            </a:r>
+          </a:p>
+        </p:txBody>
+      </p:sp>
+      <p:pic>
+        <p:nvPicPr>
+          <p:cNvPr id="3076" name="Picture 4"/>
+          <p:cNvPicPr>
+            <a:picLocks noChangeAspect="1" noChangeArrowheads="1"/>
+          </p:cNvPicPr>
+          <p:nvPr/>
+        </p:nvPicPr>
+        <p:blipFill>
+          <a:blip r:embed="rId3">
+            <a:extLst>
+              <a:ext uri="{28A0092B-C50C-407E-A947-70E740481C1C}">
+                <a14:useLocalDpi xmlns:a14="http://schemas.microsoft.com/office/drawing/2010/main" val="0"/>
+              </a:ext>
+            </a:extLst>
+          </a:blip>
+          <a:srcRect/>
+          <a:stretch>
+            <a:fillRect/>
+          </a:stretch>
+        </p:blipFill>
+        <p:spPr bwMode="auto">
+          <a:xfrm>
+            <a:off x="1834159" y="2001694"/>
+            <a:ext cx="6329362" cy="3810000"/>
+          </a:xfrm>
+          <a:prstGeom prst="rect">
+            <a:avLst/>
+          </a:prstGeom>
+          <a:noFill/>
+          <a:ln>
+            <a:noFill/>
+          </a:ln>
+          <a:effectLst/>
+          <a:extLst>
+            <a:ext uri="{909E8E84-426E-40dd-AFC4-6F175D3DCCD1}">
+              <a14:hiddenFill xmlns:a14="http://schemas.microsoft.com/office/drawing/2010/main">
+                <a:blipFill dpi="0" rotWithShape="0">
+                  <a:blip/>
+                  <a:srcRect/>
+                  <a:stretch>
+                    <a:fillRect/>
+                  </a:stretch>
+                </a:blipFill>
+              </a14:hiddenFill>
+            </a:ext>
+            <a:ext uri="{91240B29-F687-4f45-9708-019B960494DF}">
+              <a14:hiddenLine xmlns:a14="http://schemas.microsoft.com/office/drawing/2010/main" w="9525" cap="flat">
+                <a:solidFill>
+                  <a:srgbClr val="000000"/>
+                </a:solidFill>
+                <a:round/>
+                <a:headEnd/>
+                <a:tailEnd/>
+              </a14:hiddenLine>
+            </a:ext>
+            <a:ext uri="{AF507438-7753-43e0-B8FC-AC1667EBCBE1}">
+              <a14:hiddenEffects xmlns:a14="http://schemas.microsoft.com/office/drawing/2010/main">
+                <a:effectLst>
+                  <a:outerShdw blurRad="63500" dist="38099" dir="2700000" algn="ctr" rotWithShape="0">
+                    <a:srgbClr val="000000">
+                      <a:alpha val="74998"/>
+                    </a:srgbClr>
+                  </a:outerShdw>
+                </a:effectLst>
+              </a14:hiddenEffects>
+            </a:ext>
+          </a:extLst>
+        </p:spPr>
+      </p:pic>
+      <p:pic>
+        <p:nvPicPr>
+          <p:cNvPr id="6" name="Picture 5"/>
+          <p:cNvPicPr>
+            <a:picLocks noChangeAspect="1"/>
+          </p:cNvPicPr>
+          <p:nvPr/>
+        </p:nvPicPr>
+        <p:blipFill>
+          <a:blip r:embed="rId4"/>
+          <a:stretch>
+            <a:fillRect/>
+          </a:stretch>
+        </p:blipFill>
+        <p:spPr>
+          <a:xfrm>
+            <a:off x="157302" y="1446560"/>
+            <a:ext cx="1603723" cy="1242885"/>
+          </a:xfrm>
+          <a:prstGeom prst="rect">
+            <a:avLst/>
+          </a:prstGeom>
+        </p:spPr>
+      </p:pic>
+    </p:spTree>
+    <p:extLst>
+      <p:ext uri="{BB962C8B-B14F-4D97-AF65-F5344CB8AC3E}">
+        <p14:creationId xmlns:p14="http://schemas.microsoft.com/office/powerpoint/2010/main" val="889485627"/>
+      </p:ext>
+    </p:extLst>
+  </p:cSld>
+  <p:clrMapOvr>
+    <a:masterClrMapping/>
+  </p:clrMapOvr>
+  <p:transition xmlns:p14="http://schemas.microsoft.com/office/powerpoint/2010/main">
+    <p:wipe dir="r"/>
+  </p:transition>
+  <p:timing>
+    <p:tnLst>
+      <p:par>
+        <p:cTn xmlns:p14="http://schemas.microsoft.com/office/powerpoint/2010/main" id="1" dur="indefinite" nodeType="tmRoot">
+          <p:childTnLst>
+            <p:seq concurrent="1" nextAc="seek">
+              <p:cTn id="2" dur="0" nodeType="mainSeq"/>
+              <p:prevCondLst>
+                <p:cond evt="onPrev" delay="0">
+                  <p:tgtEl>
+                    <p:sldTgt/>
+                  </p:tgtEl>
+                </p:cond>
+              </p:prevCondLst>
+              <p:nextCondLst>
+                <p:cond evt="onNext" delay="0">
+                  <p:tgtEl>
+                    <p:sldTgt/>
+                  </p:tgtEl>
+                </p:cond>
+              </p:nextCondLst>
+            </p:seq>
+          </p:childTnLst>
+        </p:cTn>
+      </p:par>
+    </p:tnLst>
+  </p:timing>
+</p:sld>
+</file>
+
+<file path=ppt/slides/slide3.xml><?xml version="1.0" encoding="utf-8"?>
+<p:sld xmlns:a="http://schemas.openxmlformats.org/drawingml/2006/main" xmlns:r="http://schemas.openxmlformats.org/officeDocument/2006/relationships" xmlns:p="http://schemas.openxmlformats.org/presentationml/2006/main">
+  <p:cSld>
+    <p:spTree>
+      <p:nvGrpSpPr>
+        <p:cNvPr id="1" name=""/>
+        <p:cNvGrpSpPr/>
+        <p:nvPr/>
+      </p:nvGrpSpPr>
+      <p:grpSpPr>
+        <a:xfrm>
+          <a:off x="0" y="0"/>
+          <a:ext cx="0" cy="0"/>
+          <a:chOff x="0" y="0"/>
+          <a:chExt cx="0" cy="0"/>
+        </a:xfrm>
+      </p:grpSpPr>
       <p:pic>
         <p:nvPicPr>
           <p:cNvPr id="4" name="Picture 3" descr="Screen Shot 2019-09-03 at 3.56.15 PM.png"/>
@@ -3232,7 +4890,7 @@
 </p:sld>
 </file>
 
-<file path=ppt/slides/slide3.xml><?xml version="1.0" encoding="utf-8"?>
+<file path=ppt/slides/slide4.xml><?xml version="1.0" encoding="utf-8"?>
 <p:sld xmlns:a="http://schemas.openxmlformats.org/drawingml/2006/main" xmlns:r="http://schemas.openxmlformats.org/officeDocument/2006/relationships" xmlns:p="http://schemas.openxmlformats.org/presentationml/2006/main">
   <p:cSld>
     <p:spTree>
@@ -3340,7 +4998,7 @@
 </p:sld>
 </file>
 
-<file path=ppt/slides/slide4.xml><?xml version="1.0" encoding="utf-8"?>
+<file path=ppt/slides/slide5.xml><?xml version="1.0" encoding="utf-8"?>
 <p:sld xmlns:a="http://schemas.openxmlformats.org/drawingml/2006/main" xmlns:r="http://schemas.openxmlformats.org/officeDocument/2006/relationships" xmlns:p="http://schemas.openxmlformats.org/presentationml/2006/main">
   <p:cSld>
     <p:spTree>
@@ -3400,7 +5058,7 @@
 </p:sld>
 </file>
 
-<file path=ppt/slides/slide5.xml><?xml version="1.0" encoding="utf-8"?>
+<file path=ppt/slides/slide6.xml><?xml version="1.0" encoding="utf-8"?>
 <p:sld xmlns:a="http://schemas.openxmlformats.org/drawingml/2006/main" xmlns:r="http://schemas.openxmlformats.org/officeDocument/2006/relationships" xmlns:p="http://schemas.openxmlformats.org/presentationml/2006/main">
   <p:cSld>
     <p:spTree>
@@ -3826,4 +5484,324 @@
   </a:objectDefaults>
   <a:extraClrSchemeLst/>
 </a:theme>
+</file>
+
+<file path=ppt/theme/theme2.xml><?xml version="1.0" encoding="utf-8"?>
+<a:theme xmlns:a="http://schemas.openxmlformats.org/drawingml/2006/main" name="Office Theme">
+  <a:themeElements>
+    <a:clrScheme name="Office">
+      <a:dk1>
+        <a:sysClr val="windowText" lastClr="000000"/>
+      </a:dk1>
+      <a:lt1>
+        <a:sysClr val="window" lastClr="FFFFFF"/>
+      </a:lt1>
+      <a:dk2>
+        <a:srgbClr val="1F497D"/>
+      </a:dk2>
+      <a:lt2>
+        <a:srgbClr val="EEECE1"/>
+      </a:lt2>
+      <a:accent1>
+        <a:srgbClr val="4F81BD"/>
+      </a:accent1>
+      <a:accent2>
+        <a:srgbClr val="C0504D"/>
+      </a:accent2>
+      <a:accent3>
+        <a:srgbClr val="9BBB59"/>
+      </a:accent3>
+      <a:accent4>
+        <a:srgbClr val="8064A2"/>
+      </a:accent4>
+      <a:accent5>
+        <a:srgbClr val="4BACC6"/>
+      </a:accent5>
+      <a:accent6>
+        <a:srgbClr val="F79646"/>
+      </a:accent6>
+      <a:hlink>
+        <a:srgbClr val="0000FF"/>
+      </a:hlink>
+      <a:folHlink>
+        <a:srgbClr val="800080"/>
+      </a:folHlink>
+    </a:clrScheme>
+    <a:fontScheme name="Office">
+      <a:majorFont>
+        <a:latin typeface="Calibri"/>
+        <a:ea typeface=""/>
+        <a:cs typeface=""/>
+        <a:font script="Jpan" typeface="ＭＳ Ｐゴシック"/>
+        <a:font script="Hang" typeface="맑은 고딕"/>
+        <a:font script="Hans" typeface="宋体"/>
+        <a:font script="Hant" typeface="新細明體"/>
+        <a:font script="Arab" typeface="Times New Roman"/>
+        <a:font script="Hebr" typeface="Times New Roman"/>
+        <a:font script="Thai" typeface="Angsana New"/>
+        <a:font script="Ethi" typeface="Nyala"/>
+        <a:font script="Beng" typeface="Vrinda"/>
+        <a:font script="Gujr" typeface="Shruti"/>
+        <a:font script="Khmr" typeface="MoolBoran"/>
+        <a:font script="Knda" typeface="Tunga"/>
+        <a:font script="Guru" typeface="Raavi"/>
+        <a:font script="Cans" typeface="Euphemia"/>
+        <a:font script="Cher" typeface="Plantagenet Cherokee"/>
+        <a:font script="Yiii" typeface="Microsoft Yi Baiti"/>
+        <a:font script="Tibt" typeface="Microsoft Himalaya"/>
+        <a:font script="Thaa" typeface="MV Boli"/>
+        <a:font script="Deva" typeface="Mangal"/>
+        <a:font script="Telu" typeface="Gautami"/>
+        <a:font script="Taml" typeface="Latha"/>
+        <a:font script="Syrc" typeface="Estrangelo Edessa"/>
+        <a:font script="Orya" typeface="Kalinga"/>
+        <a:font script="Mlym" typeface="Kartika"/>
+        <a:font script="Laoo" typeface="DokChampa"/>
+        <a:font script="Sinh" typeface="Iskoola Pota"/>
+        <a:font script="Mong" typeface="Mongolian Baiti"/>
+        <a:font script="Viet" typeface="Times New Roman"/>
+        <a:font script="Uigh" typeface="Microsoft Uighur"/>
+        <a:font script="Geor" typeface="Sylfaen"/>
+      </a:majorFont>
+      <a:minorFont>
+        <a:latin typeface="Calibri"/>
+        <a:ea typeface=""/>
+        <a:cs typeface=""/>
+        <a:font script="Jpan" typeface="ＭＳ Ｐゴシック"/>
+        <a:font script="Hang" typeface="맑은 고딕"/>
+        <a:font script="Hans" typeface="宋体"/>
+        <a:font script="Hant" typeface="新細明體"/>
+        <a:font script="Arab" typeface="Arial"/>
+        <a:font script="Hebr" typeface="Arial"/>
+        <a:font script="Thai" typeface="Cordia New"/>
+        <a:font script="Ethi" typeface="Nyala"/>
+        <a:font script="Beng" typeface="Vrinda"/>
+        <a:font script="Gujr" typeface="Shruti"/>
+        <a:font script="Khmr" typeface="DaunPenh"/>
+        <a:font script="Knda" typeface="Tunga"/>
+        <a:font script="Guru" typeface="Raavi"/>
+        <a:font script="Cans" typeface="Euphemia"/>
+        <a:font script="Cher" typeface="Plantagenet Cherokee"/>
+        <a:font script="Yiii" typeface="Microsoft Yi Baiti"/>
+        <a:font script="Tibt" typeface="Microsoft Himalaya"/>
+        <a:font script="Thaa" typeface="MV Boli"/>
+        <a:font script="Deva" typeface="Mangal"/>
+        <a:font script="Telu" typeface="Gautami"/>
+        <a:font script="Taml" typeface="Latha"/>
+        <a:font script="Syrc" typeface="Estrangelo Edessa"/>
+        <a:font script="Orya" typeface="Kalinga"/>
+        <a:font script="Mlym" typeface="Kartika"/>
+        <a:font script="Laoo" typeface="DokChampa"/>
+        <a:font script="Sinh" typeface="Iskoola Pota"/>
+        <a:font script="Mong" typeface="Mongolian Baiti"/>
+        <a:font script="Viet" typeface="Arial"/>
+        <a:font script="Uigh" typeface="Microsoft Uighur"/>
+        <a:font script="Geor" typeface="Sylfaen"/>
+      </a:minorFont>
+    </a:fontScheme>
+    <a:fmtScheme name="Office">
+      <a:fillStyleLst>
+        <a:solidFill>
+          <a:schemeClr val="phClr"/>
+        </a:solidFill>
+        <a:gradFill rotWithShape="1">
+          <a:gsLst>
+            <a:gs pos="0">
+              <a:schemeClr val="phClr">
+                <a:tint val="50000"/>
+                <a:satMod val="300000"/>
+              </a:schemeClr>
+            </a:gs>
+            <a:gs pos="35000">
+              <a:schemeClr val="phClr">
+                <a:tint val="37000"/>
+                <a:satMod val="300000"/>
+              </a:schemeClr>
+            </a:gs>
+            <a:gs pos="100000">
+              <a:schemeClr val="phClr">
+                <a:tint val="15000"/>
+                <a:satMod val="350000"/>
+              </a:schemeClr>
+            </a:gs>
+          </a:gsLst>
+          <a:lin ang="16200000" scaled="1"/>
+        </a:gradFill>
+        <a:gradFill rotWithShape="1">
+          <a:gsLst>
+            <a:gs pos="0">
+              <a:schemeClr val="phClr">
+                <a:tint val="100000"/>
+                <a:shade val="100000"/>
+                <a:satMod val="130000"/>
+              </a:schemeClr>
+            </a:gs>
+            <a:gs pos="100000">
+              <a:schemeClr val="phClr">
+                <a:tint val="50000"/>
+                <a:shade val="100000"/>
+                <a:satMod val="350000"/>
+              </a:schemeClr>
+            </a:gs>
+          </a:gsLst>
+          <a:lin ang="16200000" scaled="0"/>
+        </a:gradFill>
+      </a:fillStyleLst>
+      <a:lnStyleLst>
+        <a:ln w="9525" cap="flat" cmpd="sng" algn="ctr">
+          <a:solidFill>
+            <a:schemeClr val="phClr">
+              <a:shade val="95000"/>
+              <a:satMod val="105000"/>
+            </a:schemeClr>
+          </a:solidFill>
+          <a:prstDash val="solid"/>
+        </a:ln>
+        <a:ln w="25400" cap="flat" cmpd="sng" algn="ctr">
+          <a:solidFill>
+            <a:schemeClr val="phClr"/>
+          </a:solidFill>
+          <a:prstDash val="solid"/>
+        </a:ln>
+        <a:ln w="38100" cap="flat" cmpd="sng" algn="ctr">
+          <a:solidFill>
+            <a:schemeClr val="phClr"/>
+          </a:solidFill>
+          <a:prstDash val="solid"/>
+        </a:ln>
+      </a:lnStyleLst>
+      <a:effectStyleLst>
+        <a:effectStyle>
+          <a:effectLst>
+            <a:outerShdw blurRad="40000" dist="20000" dir="5400000" rotWithShape="0">
+              <a:srgbClr val="000000">
+                <a:alpha val="38000"/>
+              </a:srgbClr>
+            </a:outerShdw>
+          </a:effectLst>
+        </a:effectStyle>
+        <a:effectStyle>
+          <a:effectLst>
+            <a:outerShdw blurRad="40000" dist="23000" dir="5400000" rotWithShape="0">
+              <a:srgbClr val="000000">
+                <a:alpha val="35000"/>
+              </a:srgbClr>
+            </a:outerShdw>
+          </a:effectLst>
+        </a:effectStyle>
+        <a:effectStyle>
+          <a:effectLst>
+            <a:outerShdw blurRad="40000" dist="23000" dir="5400000" rotWithShape="0">
+              <a:srgbClr val="000000">
+                <a:alpha val="35000"/>
+              </a:srgbClr>
+            </a:outerShdw>
+          </a:effectLst>
+          <a:scene3d>
+            <a:camera prst="orthographicFront">
+              <a:rot lat="0" lon="0" rev="0"/>
+            </a:camera>
+            <a:lightRig rig="threePt" dir="t">
+              <a:rot lat="0" lon="0" rev="1200000"/>
+            </a:lightRig>
+          </a:scene3d>
+          <a:sp3d>
+            <a:bevelT w="63500" h="25400"/>
+          </a:sp3d>
+        </a:effectStyle>
+      </a:effectStyleLst>
+      <a:bgFillStyleLst>
+        <a:solidFill>
+          <a:schemeClr val="phClr"/>
+        </a:solidFill>
+        <a:gradFill rotWithShape="1">
+          <a:gsLst>
+            <a:gs pos="0">
+              <a:schemeClr val="phClr">
+                <a:tint val="40000"/>
+                <a:satMod val="350000"/>
+              </a:schemeClr>
+            </a:gs>
+            <a:gs pos="40000">
+              <a:schemeClr val="phClr">
+                <a:tint val="45000"/>
+                <a:shade val="99000"/>
+                <a:satMod val="350000"/>
+              </a:schemeClr>
+            </a:gs>
+            <a:gs pos="100000">
+              <a:schemeClr val="phClr">
+                <a:shade val="20000"/>
+                <a:satMod val="255000"/>
+              </a:schemeClr>
+            </a:gs>
+          </a:gsLst>
+          <a:path path="circle">
+            <a:fillToRect l="50000" t="-80000" r="50000" b="180000"/>
+          </a:path>
+        </a:gradFill>
+        <a:gradFill rotWithShape="1">
+          <a:gsLst>
+            <a:gs pos="0">
+              <a:schemeClr val="phClr">
+                <a:tint val="80000"/>
+                <a:satMod val="300000"/>
+              </a:schemeClr>
+            </a:gs>
+            <a:gs pos="100000">
+              <a:schemeClr val="phClr">
+                <a:shade val="30000"/>
+                <a:satMod val="200000"/>
+              </a:schemeClr>
+            </a:gs>
+          </a:gsLst>
+          <a:path path="circle">
+            <a:fillToRect l="50000" t="50000" r="50000" b="50000"/>
+          </a:path>
+        </a:gradFill>
+      </a:bgFillStyleLst>
+    </a:fmtScheme>
+  </a:themeElements>
+  <a:objectDefaults>
+    <a:spDef>
+      <a:spPr/>
+      <a:bodyPr/>
+      <a:lstStyle/>
+      <a:style>
+        <a:lnRef idx="1">
+          <a:schemeClr val="accent1"/>
+        </a:lnRef>
+        <a:fillRef idx="3">
+          <a:schemeClr val="accent1"/>
+        </a:fillRef>
+        <a:effectRef idx="2">
+          <a:schemeClr val="accent1"/>
+        </a:effectRef>
+        <a:fontRef idx="minor">
+          <a:schemeClr val="lt1"/>
+        </a:fontRef>
+      </a:style>
+    </a:spDef>
+    <a:lnDef>
+      <a:spPr/>
+      <a:bodyPr/>
+      <a:lstStyle/>
+      <a:style>
+        <a:lnRef idx="2">
+          <a:schemeClr val="accent1"/>
+        </a:lnRef>
+        <a:fillRef idx="0">
+          <a:schemeClr val="accent1"/>
+        </a:fillRef>
+        <a:effectRef idx="1">
+          <a:schemeClr val="accent1"/>
+        </a:effectRef>
+        <a:fontRef idx="minor">
+          <a:schemeClr val="tx1"/>
+        </a:fontRef>
+      </a:style>
+    </a:lnDef>
+  </a:objectDefaults>
+  <a:extraClrSchemeLst/>
+</a:theme>
 </file>
</xml_diff>